<commit_message>
Fixed issue of duplicate slide.
</commit_message>
<xml_diff>
--- a/Proposal/ProductProposalPresentation.pptx
+++ b/Proposal/ProductProposalPresentation.pptx
@@ -6,7 +6,7 @@
     <p:sldMasterId id="2147483667" r:id="rId2"/>
   </p:sldMasterIdLst>
   <p:notesMasterIdLst>
-    <p:notesMasterId r:id="rId15"/>
+    <p:notesMasterId r:id="rId14"/>
   </p:notesMasterIdLst>
   <p:sldIdLst>
     <p:sldId id="256" r:id="rId3"/>
@@ -16,11 +16,10 @@
     <p:sldId id="260" r:id="rId7"/>
     <p:sldId id="261" r:id="rId8"/>
     <p:sldId id="262" r:id="rId9"/>
-    <p:sldId id="263" r:id="rId10"/>
-    <p:sldId id="264" r:id="rId11"/>
-    <p:sldId id="265" r:id="rId12"/>
-    <p:sldId id="266" r:id="rId13"/>
-    <p:sldId id="267" r:id="rId14"/>
+    <p:sldId id="264" r:id="rId10"/>
+    <p:sldId id="265" r:id="rId11"/>
+    <p:sldId id="266" r:id="rId12"/>
+    <p:sldId id="267" r:id="rId13"/>
   </p:sldIdLst>
   <p:sldSz cx="9144000" cy="6858000" type="screen4x3"/>
   <p:notesSz cx="6858000" cy="9144000"/>
@@ -579,106 +578,6 @@
   <p:cSld>
     <p:spTree>
       <p:nvGrpSpPr>
-        <p:cNvPr id="1" name="Shape 187"/>
-        <p:cNvGrpSpPr/>
-        <p:nvPr/>
-      </p:nvGrpSpPr>
-      <p:grpSpPr>
-        <a:xfrm>
-          <a:off x="0" y="0"/>
-          <a:ext cx="0" cy="0"/>
-          <a:chOff x="0" y="0"/>
-          <a:chExt cx="0" cy="0"/>
-        </a:xfrm>
-      </p:grpSpPr>
-      <p:sp>
-        <p:nvSpPr>
-          <p:cNvPr id="188" name="Shape 188"/>
-          <p:cNvSpPr txBox="1">
-            <a:spLocks noGrp="1"/>
-          </p:cNvSpPr>
-          <p:nvPr>
-            <p:ph type="body" idx="1"/>
-          </p:nvPr>
-        </p:nvSpPr>
-        <p:spPr>
-          <a:xfrm>
-            <a:off x="685800" y="4343400"/>
-            <a:ext cx="5486399" cy="4114800"/>
-          </a:xfrm>
-          <a:prstGeom prst="rect">
-            <a:avLst/>
-          </a:prstGeom>
-        </p:spPr>
-        <p:txBody>
-          <a:bodyPr lIns="91425" tIns="91425" rIns="91425" bIns="91425" anchor="ctr" anchorCtr="0">
-            <a:noAutofit/>
-          </a:bodyPr>
-          <a:lstStyle/>
-          <a:p>
-            <a:endParaRPr/>
-          </a:p>
-        </p:txBody>
-      </p:sp>
-      <p:sp>
-        <p:nvSpPr>
-          <p:cNvPr id="189" name="Shape 189"/>
-          <p:cNvSpPr>
-            <a:spLocks noGrp="1" noRot="1" noChangeAspect="1"/>
-          </p:cNvSpPr>
-          <p:nvPr>
-            <p:ph type="sldImg" idx="2"/>
-          </p:nvPr>
-        </p:nvSpPr>
-        <p:spPr>
-          <a:xfrm>
-            <a:off x="1143000" y="685800"/>
-            <a:ext cx="4572000" cy="3429000"/>
-          </a:xfrm>
-          <a:custGeom>
-            <a:avLst/>
-            <a:gdLst/>
-            <a:ahLst/>
-            <a:cxnLst/>
-            <a:rect l="0" t="0" r="0" b="0"/>
-            <a:pathLst>
-              <a:path w="120000" h="120000" extrusionOk="0">
-                <a:moveTo>
-                  <a:pt x="0" y="0"/>
-                </a:moveTo>
-                <a:lnTo>
-                  <a:pt x="120000" y="0"/>
-                </a:lnTo>
-                <a:lnTo>
-                  <a:pt x="120000" y="120000"/>
-                </a:lnTo>
-                <a:lnTo>
-                  <a:pt x="0" y="120000"/>
-                </a:lnTo>
-                <a:close/>
-              </a:path>
-            </a:pathLst>
-          </a:custGeom>
-        </p:spPr>
-      </p:sp>
-    </p:spTree>
-    <p:extLst>
-      <p:ext uri="{BB962C8B-B14F-4D97-AF65-F5344CB8AC3E}">
-        <p14:creationId xmlns:p14="http://schemas.microsoft.com/office/powerpoint/2010/main" val="2402458302"/>
-      </p:ext>
-    </p:extLst>
-  </p:cSld>
-  <p:clrMapOvr>
-    <a:masterClrMapping/>
-  </p:clrMapOvr>
-</p:notes>
-</file>
-
-<file path=ppt/notesSlides/notesSlide11.xml><?xml version="1.0" encoding="utf-8"?>
-<p:notes xmlns:a="http://schemas.openxmlformats.org/drawingml/2006/main" xmlns:r="http://schemas.openxmlformats.org/officeDocument/2006/relationships" xmlns:p="http://schemas.openxmlformats.org/presentationml/2006/main" showMasterSp="0" showMasterPhAnim="0">
-  <p:cSld>
-    <p:spTree>
-      <p:nvGrpSpPr>
         <p:cNvPr id="1" name="Shape 211"/>
         <p:cNvGrpSpPr/>
         <p:nvPr/>
@@ -774,7 +673,7 @@
 </p:notes>
 </file>
 
-<file path=ppt/notesSlides/notesSlide12.xml><?xml version="1.0" encoding="utf-8"?>
+<file path=ppt/notesSlides/notesSlide11.xml><?xml version="1.0" encoding="utf-8"?>
 <p:notes xmlns:a="http://schemas.openxmlformats.org/drawingml/2006/main" xmlns:r="http://schemas.openxmlformats.org/officeDocument/2006/relationships" xmlns:p="http://schemas.openxmlformats.org/presentationml/2006/main" showMasterSp="0" showMasterPhAnim="0">
   <p:cSld>
     <p:spTree>
@@ -1479,106 +1378,6 @@
   <p:cSld>
     <p:spTree>
       <p:nvGrpSpPr>
-        <p:cNvPr id="1" name="Shape 169"/>
-        <p:cNvGrpSpPr/>
-        <p:nvPr/>
-      </p:nvGrpSpPr>
-      <p:grpSpPr>
-        <a:xfrm>
-          <a:off x="0" y="0"/>
-          <a:ext cx="0" cy="0"/>
-          <a:chOff x="0" y="0"/>
-          <a:chExt cx="0" cy="0"/>
-        </a:xfrm>
-      </p:grpSpPr>
-      <p:sp>
-        <p:nvSpPr>
-          <p:cNvPr id="170" name="Shape 170"/>
-          <p:cNvSpPr txBox="1">
-            <a:spLocks noGrp="1"/>
-          </p:cNvSpPr>
-          <p:nvPr>
-            <p:ph type="body" idx="1"/>
-          </p:nvPr>
-        </p:nvSpPr>
-        <p:spPr>
-          <a:xfrm>
-            <a:off x="685800" y="4343400"/>
-            <a:ext cx="5486399" cy="4114800"/>
-          </a:xfrm>
-          <a:prstGeom prst="rect">
-            <a:avLst/>
-          </a:prstGeom>
-        </p:spPr>
-        <p:txBody>
-          <a:bodyPr lIns="91425" tIns="91425" rIns="91425" bIns="91425" anchor="ctr" anchorCtr="0">
-            <a:noAutofit/>
-          </a:bodyPr>
-          <a:lstStyle/>
-          <a:p>
-            <a:endParaRPr/>
-          </a:p>
-        </p:txBody>
-      </p:sp>
-      <p:sp>
-        <p:nvSpPr>
-          <p:cNvPr id="171" name="Shape 171"/>
-          <p:cNvSpPr>
-            <a:spLocks noGrp="1" noRot="1" noChangeAspect="1"/>
-          </p:cNvSpPr>
-          <p:nvPr>
-            <p:ph type="sldImg" idx="2"/>
-          </p:nvPr>
-        </p:nvSpPr>
-        <p:spPr>
-          <a:xfrm>
-            <a:off x="1143000" y="685800"/>
-            <a:ext cx="4572000" cy="3429000"/>
-          </a:xfrm>
-          <a:custGeom>
-            <a:avLst/>
-            <a:gdLst/>
-            <a:ahLst/>
-            <a:cxnLst/>
-            <a:rect l="0" t="0" r="0" b="0"/>
-            <a:pathLst>
-              <a:path w="120000" h="120000" extrusionOk="0">
-                <a:moveTo>
-                  <a:pt x="0" y="0"/>
-                </a:moveTo>
-                <a:lnTo>
-                  <a:pt x="120000" y="0"/>
-                </a:lnTo>
-                <a:lnTo>
-                  <a:pt x="120000" y="120000"/>
-                </a:lnTo>
-                <a:lnTo>
-                  <a:pt x="0" y="120000"/>
-                </a:lnTo>
-                <a:close/>
-              </a:path>
-            </a:pathLst>
-          </a:custGeom>
-        </p:spPr>
-      </p:sp>
-    </p:spTree>
-    <p:extLst>
-      <p:ext uri="{BB962C8B-B14F-4D97-AF65-F5344CB8AC3E}">
-        <p14:creationId xmlns:p14="http://schemas.microsoft.com/office/powerpoint/2010/main" val="536953016"/>
-      </p:ext>
-    </p:extLst>
-  </p:cSld>
-  <p:clrMapOvr>
-    <a:masterClrMapping/>
-  </p:clrMapOvr>
-</p:notes>
-</file>
-
-<file path=ppt/notesSlides/notesSlide9.xml><?xml version="1.0" encoding="utf-8"?>
-<p:notes xmlns:a="http://schemas.openxmlformats.org/drawingml/2006/main" xmlns:r="http://schemas.openxmlformats.org/officeDocument/2006/relationships" xmlns:p="http://schemas.openxmlformats.org/presentationml/2006/main" showMasterSp="0" showMasterPhAnim="0">
-  <p:cSld>
-    <p:spTree>
-      <p:nvGrpSpPr>
         <p:cNvPr id="1" name="Shape 179"/>
         <p:cNvGrpSpPr/>
         <p:nvPr/>
@@ -1665,6 +1464,106 @@
     <p:extLst>
       <p:ext uri="{BB962C8B-B14F-4D97-AF65-F5344CB8AC3E}">
         <p14:creationId xmlns:p14="http://schemas.microsoft.com/office/powerpoint/2010/main" val="591629348"/>
+      </p:ext>
+    </p:extLst>
+  </p:cSld>
+  <p:clrMapOvr>
+    <a:masterClrMapping/>
+  </p:clrMapOvr>
+</p:notes>
+</file>
+
+<file path=ppt/notesSlides/notesSlide9.xml><?xml version="1.0" encoding="utf-8"?>
+<p:notes xmlns:a="http://schemas.openxmlformats.org/drawingml/2006/main" xmlns:r="http://schemas.openxmlformats.org/officeDocument/2006/relationships" xmlns:p="http://schemas.openxmlformats.org/presentationml/2006/main" showMasterSp="0" showMasterPhAnim="0">
+  <p:cSld>
+    <p:spTree>
+      <p:nvGrpSpPr>
+        <p:cNvPr id="1" name="Shape 187"/>
+        <p:cNvGrpSpPr/>
+        <p:nvPr/>
+      </p:nvGrpSpPr>
+      <p:grpSpPr>
+        <a:xfrm>
+          <a:off x="0" y="0"/>
+          <a:ext cx="0" cy="0"/>
+          <a:chOff x="0" y="0"/>
+          <a:chExt cx="0" cy="0"/>
+        </a:xfrm>
+      </p:grpSpPr>
+      <p:sp>
+        <p:nvSpPr>
+          <p:cNvPr id="188" name="Shape 188"/>
+          <p:cNvSpPr txBox="1">
+            <a:spLocks noGrp="1"/>
+          </p:cNvSpPr>
+          <p:nvPr>
+            <p:ph type="body" idx="1"/>
+          </p:nvPr>
+        </p:nvSpPr>
+        <p:spPr>
+          <a:xfrm>
+            <a:off x="685800" y="4343400"/>
+            <a:ext cx="5486399" cy="4114800"/>
+          </a:xfrm>
+          <a:prstGeom prst="rect">
+            <a:avLst/>
+          </a:prstGeom>
+        </p:spPr>
+        <p:txBody>
+          <a:bodyPr lIns="91425" tIns="91425" rIns="91425" bIns="91425" anchor="ctr" anchorCtr="0">
+            <a:noAutofit/>
+          </a:bodyPr>
+          <a:lstStyle/>
+          <a:p>
+            <a:endParaRPr/>
+          </a:p>
+        </p:txBody>
+      </p:sp>
+      <p:sp>
+        <p:nvSpPr>
+          <p:cNvPr id="189" name="Shape 189"/>
+          <p:cNvSpPr>
+            <a:spLocks noGrp="1" noRot="1" noChangeAspect="1"/>
+          </p:cNvSpPr>
+          <p:nvPr>
+            <p:ph type="sldImg" idx="2"/>
+          </p:nvPr>
+        </p:nvSpPr>
+        <p:spPr>
+          <a:xfrm>
+            <a:off x="1143000" y="685800"/>
+            <a:ext cx="4572000" cy="3429000"/>
+          </a:xfrm>
+          <a:custGeom>
+            <a:avLst/>
+            <a:gdLst/>
+            <a:ahLst/>
+            <a:cxnLst/>
+            <a:rect l="0" t="0" r="0" b="0"/>
+            <a:pathLst>
+              <a:path w="120000" h="120000" extrusionOk="0">
+                <a:moveTo>
+                  <a:pt x="0" y="0"/>
+                </a:moveTo>
+                <a:lnTo>
+                  <a:pt x="120000" y="0"/>
+                </a:lnTo>
+                <a:lnTo>
+                  <a:pt x="120000" y="120000"/>
+                </a:lnTo>
+                <a:lnTo>
+                  <a:pt x="0" y="120000"/>
+                </a:lnTo>
+                <a:close/>
+              </a:path>
+            </a:pathLst>
+          </a:custGeom>
+        </p:spPr>
+      </p:sp>
+    </p:spTree>
+    <p:extLst>
+      <p:ext uri="{BB962C8B-B14F-4D97-AF65-F5344CB8AC3E}">
+        <p14:creationId xmlns:p14="http://schemas.microsoft.com/office/powerpoint/2010/main" val="2402458302"/>
       </p:ext>
     </p:extLst>
   </p:cSld>
@@ -13512,398 +13411,6 @@
   <p:cSld>
     <p:spTree>
       <p:nvGrpSpPr>
-        <p:cNvPr id="1" name="Shape 182"/>
-        <p:cNvGrpSpPr/>
-        <p:nvPr/>
-      </p:nvGrpSpPr>
-      <p:grpSpPr>
-        <a:xfrm>
-          <a:off x="0" y="0"/>
-          <a:ext cx="0" cy="0"/>
-          <a:chOff x="0" y="0"/>
-          <a:chExt cx="0" cy="0"/>
-        </a:xfrm>
-      </p:grpSpPr>
-      <p:sp>
-        <p:nvSpPr>
-          <p:cNvPr id="183" name="Shape 183"/>
-          <p:cNvSpPr/>
-          <p:nvPr/>
-        </p:nvSpPr>
-        <p:spPr>
-          <a:xfrm>
-            <a:off x="5486400" y="5486400"/>
-            <a:ext cx="3657599" cy="1367326"/>
-          </a:xfrm>
-          <a:prstGeom prst="rect">
-            <a:avLst/>
-          </a:prstGeom>
-          <a:blipFill>
-            <a:blip r:embed="rId3"/>
-            <a:stretch>
-              <a:fillRect/>
-            </a:stretch>
-          </a:blipFill>
-        </p:spPr>
-      </p:sp>
-      <p:cxnSp>
-        <p:nvCxnSpPr>
-          <p:cNvPr id="184" name="Shape 184"/>
-          <p:cNvCxnSpPr/>
-          <p:nvPr/>
-        </p:nvCxnSpPr>
-        <p:spPr>
-          <a:xfrm>
-            <a:off x="0" y="1066800"/>
-            <a:ext cx="6019799" cy="0"/>
-          </a:xfrm>
-          <a:prstGeom prst="straightConnector1">
-            <a:avLst/>
-          </a:prstGeom>
-          <a:noFill/>
-          <a:ln w="28575" cap="flat">
-            <a:solidFill>
-              <a:schemeClr val="dk1"/>
-            </a:solidFill>
-            <a:prstDash val="solid"/>
-            <a:round/>
-            <a:headEnd type="none" w="med" len="med"/>
-            <a:tailEnd type="none" w="med" len="med"/>
-          </a:ln>
-        </p:spPr>
-      </p:cxnSp>
-      <p:sp>
-        <p:nvSpPr>
-          <p:cNvPr id="185" name="Shape 185"/>
-          <p:cNvSpPr txBox="1"/>
-          <p:nvPr/>
-        </p:nvSpPr>
-        <p:spPr>
-          <a:xfrm>
-            <a:off x="665075" y="1350325"/>
-            <a:ext cx="6468300" cy="4031999"/>
-          </a:xfrm>
-          <a:prstGeom prst="rect">
-            <a:avLst/>
-          </a:prstGeom>
-          <a:noFill/>
-          <a:ln>
-            <a:noFill/>
-          </a:ln>
-        </p:spPr>
-        <p:txBody>
-          <a:bodyPr lIns="91425" tIns="45700" rIns="91425" bIns="45700" anchor="t" anchorCtr="0">
-            <a:noAutofit/>
-          </a:bodyPr>
-          <a:lstStyle/>
-          <a:p>
-            <a:pPr marR="0" lvl="0" algn="l" rtl="0">
-              <a:buNone/>
-            </a:pPr>
-            <a:r>
-              <a:rPr lang="en" sz="1800" dirty="0">
-                <a:solidFill>
-                  <a:schemeClr val="dk1"/>
-                </a:solidFill>
-                <a:latin typeface="Cantarell"/>
-                <a:ea typeface="Cantarell"/>
-                <a:cs typeface="Cantarell"/>
-                <a:sym typeface="Cantarell"/>
-              </a:rPr>
-              <a:t>User Features (Continued):</a:t>
-            </a:r>
-          </a:p>
-          <a:p>
-            <a:pPr marL="457200" marR="0" lvl="0" indent="-342900" algn="l" rtl="0">
-              <a:buClr>
-                <a:srgbClr val="000000"/>
-              </a:buClr>
-              <a:buSzPct val="100000"/>
-              <a:buFont typeface="Cantarell"/>
-              <a:buChar char="●"/>
-            </a:pPr>
-            <a:r>
-              <a:rPr lang="en" sz="1800" b="0" i="0" u="none" strike="noStrike" cap="none" baseline="0" dirty="0">
-                <a:solidFill>
-                  <a:schemeClr val="dk1"/>
-                </a:solidFill>
-                <a:latin typeface="Cantarell"/>
-                <a:ea typeface="Cantarell"/>
-                <a:cs typeface="Cantarell"/>
-                <a:sym typeface="Cantarell"/>
-              </a:rPr>
-              <a:t>Remember where I was? → Allow user to post memo or record location to remember location in one </a:t>
-            </a:r>
-            <a:r>
-              <a:rPr lang="en" sz="1800" b="0" i="0" u="none" strike="noStrike" cap="none" baseline="0" dirty="0" smtClean="0">
-                <a:solidFill>
-                  <a:schemeClr val="dk1"/>
-                </a:solidFill>
-                <a:latin typeface="Cantarell"/>
-                <a:ea typeface="Cantarell"/>
-                <a:cs typeface="Cantarell"/>
-                <a:sym typeface="Cantarell"/>
-              </a:rPr>
-              <a:t>click</a:t>
-            </a:r>
-          </a:p>
-          <a:p>
-            <a:pPr marL="114300" marR="0" lvl="0" algn="l" rtl="0">
-              <a:buClr>
-                <a:srgbClr val="000000"/>
-              </a:buClr>
-              <a:buSzPct val="100000"/>
-            </a:pPr>
-            <a:endParaRPr lang="en" sz="1800" b="0" i="0" u="none" strike="noStrike" cap="none" baseline="0" dirty="0">
-              <a:solidFill>
-                <a:schemeClr val="dk1"/>
-              </a:solidFill>
-              <a:latin typeface="Cantarell"/>
-              <a:ea typeface="Cantarell"/>
-              <a:cs typeface="Cantarell"/>
-              <a:sym typeface="Cantarell"/>
-            </a:endParaRPr>
-          </a:p>
-          <a:p>
-            <a:pPr marL="457200" marR="0" lvl="0" indent="-342900" algn="l" rtl="0">
-              <a:buClr>
-                <a:srgbClr val="000000"/>
-              </a:buClr>
-              <a:buSzPct val="100000"/>
-              <a:buFont typeface="Cantarell"/>
-              <a:buChar char="●"/>
-            </a:pPr>
-            <a:r>
-              <a:rPr lang="en" sz="1800" b="0" i="0" u="none" strike="noStrike" cap="none" baseline="0" dirty="0">
-                <a:solidFill>
-                  <a:schemeClr val="dk1"/>
-                </a:solidFill>
-                <a:latin typeface="Cantarell"/>
-                <a:ea typeface="Cantarell"/>
-                <a:cs typeface="Cantarell"/>
-                <a:sym typeface="Cantarell"/>
-              </a:rPr>
-              <a:t>One click Google Map directions to parking garage</a:t>
-            </a:r>
-          </a:p>
-          <a:p>
-            <a:endParaRPr lang="en" sz="1800" b="0" i="0" u="none" strike="noStrike" cap="none" baseline="0" dirty="0">
-              <a:solidFill>
-                <a:schemeClr val="dk1"/>
-              </a:solidFill>
-              <a:latin typeface="Cantarell"/>
-              <a:ea typeface="Cantarell"/>
-              <a:cs typeface="Cantarell"/>
-              <a:sym typeface="Cantarell"/>
-            </a:endParaRPr>
-          </a:p>
-          <a:p>
-            <a:pPr marL="457200" lvl="0" indent="-342900" rtl="0">
-              <a:buClr>
-                <a:srgbClr val="000000"/>
-              </a:buClr>
-              <a:buSzPct val="100000"/>
-              <a:buFont typeface="Cantarell"/>
-              <a:buChar char="●"/>
-            </a:pPr>
-            <a:r>
-              <a:rPr lang="en" sz="1800" dirty="0">
-                <a:latin typeface="Cantarell"/>
-                <a:ea typeface="Cantarell"/>
-                <a:cs typeface="Cantarell"/>
-                <a:sym typeface="Cantarell"/>
-              </a:rPr>
-              <a:t>QR code accessibility</a:t>
-            </a:r>
-          </a:p>
-          <a:p>
-            <a:endParaRPr lang="en" sz="1800" dirty="0">
-              <a:latin typeface="Cantarell"/>
-              <a:ea typeface="Cantarell"/>
-              <a:cs typeface="Cantarell"/>
-              <a:sym typeface="Cantarell"/>
-            </a:endParaRPr>
-          </a:p>
-          <a:p>
-            <a:pPr marL="457200" lvl="0" indent="-342900" rtl="0">
-              <a:buClr>
-                <a:srgbClr val="000000"/>
-              </a:buClr>
-              <a:buSzPct val="100000"/>
-              <a:buFont typeface="Cantarell"/>
-              <a:buChar char="●"/>
-            </a:pPr>
-            <a:r>
-              <a:rPr lang="en" sz="1800" dirty="0">
-                <a:latin typeface="Cantarell"/>
-                <a:ea typeface="Cantarell"/>
-                <a:cs typeface="Cantarell"/>
-                <a:sym typeface="Cantarell"/>
-              </a:rPr>
-              <a:t>Filter parking garages by cost, distance, and </a:t>
-            </a:r>
-            <a:r>
-              <a:rPr lang="en" sz="1800" dirty="0" smtClean="0">
-                <a:latin typeface="Cantarell"/>
-                <a:ea typeface="Cantarell"/>
-                <a:cs typeface="Cantarell"/>
-                <a:sym typeface="Cantarell"/>
-              </a:rPr>
-              <a:t>capacity</a:t>
-            </a:r>
-          </a:p>
-          <a:p>
-            <a:pPr marL="114300" lvl="0" rtl="0">
-              <a:buClr>
-                <a:srgbClr val="000000"/>
-              </a:buClr>
-              <a:buSzPct val="100000"/>
-            </a:pPr>
-            <a:endParaRPr lang="en" sz="1800" dirty="0">
-              <a:latin typeface="Cantarell"/>
-              <a:ea typeface="Cantarell"/>
-              <a:cs typeface="Cantarell"/>
-              <a:sym typeface="Cantarell"/>
-            </a:endParaRPr>
-          </a:p>
-          <a:p>
-            <a:pPr marL="457200" lvl="0" indent="-342900" rtl="0">
-              <a:buClr>
-                <a:schemeClr val="dk1"/>
-              </a:buClr>
-              <a:buSzPct val="100000"/>
-              <a:buFont typeface="Cantarell"/>
-              <a:buChar char="●"/>
-            </a:pPr>
-            <a:r>
-              <a:rPr lang="en" sz="1800" dirty="0">
-                <a:solidFill>
-                  <a:schemeClr val="dk1"/>
-                </a:solidFill>
-                <a:latin typeface="Cantarell"/>
-                <a:ea typeface="Cantarell"/>
-                <a:cs typeface="Cantarell"/>
-                <a:sym typeface="Cantarell"/>
-              </a:rPr>
-              <a:t>Ability to report a user if necessary</a:t>
-            </a:r>
-          </a:p>
-          <a:p>
-            <a:pPr marL="914400" lvl="1" indent="-342900" rtl="0">
-              <a:buClr>
-                <a:schemeClr val="dk1"/>
-              </a:buClr>
-              <a:buSzPct val="100000"/>
-              <a:buFont typeface="Cantarell"/>
-              <a:buChar char="○"/>
-            </a:pPr>
-            <a:r>
-              <a:rPr lang="en" sz="1800" dirty="0">
-                <a:solidFill>
-                  <a:schemeClr val="dk1"/>
-                </a:solidFill>
-                <a:latin typeface="Cantarell"/>
-                <a:ea typeface="Cantarell"/>
-                <a:cs typeface="Cantarell"/>
-                <a:sym typeface="Cantarell"/>
-              </a:rPr>
-              <a:t>For foul language or faulty ratings</a:t>
-            </a:r>
-          </a:p>
-          <a:p>
-            <a:endParaRPr lang="en" sz="1800" dirty="0">
-              <a:solidFill>
-                <a:schemeClr val="dk1"/>
-              </a:solidFill>
-              <a:latin typeface="Cantarell"/>
-              <a:ea typeface="Cantarell"/>
-              <a:cs typeface="Cantarell"/>
-              <a:sym typeface="Cantarell"/>
-            </a:endParaRPr>
-          </a:p>
-          <a:p>
-            <a:endParaRPr lang="en" sz="1800" dirty="0">
-              <a:solidFill>
-                <a:schemeClr val="dk1"/>
-              </a:solidFill>
-              <a:latin typeface="Cantarell"/>
-              <a:ea typeface="Cantarell"/>
-              <a:cs typeface="Cantarell"/>
-              <a:sym typeface="Cantarell"/>
-            </a:endParaRPr>
-          </a:p>
-          <a:p>
-            <a:endParaRPr lang="en" sz="1800" dirty="0">
-              <a:solidFill>
-                <a:schemeClr val="dk1"/>
-              </a:solidFill>
-              <a:latin typeface="Cantarell"/>
-              <a:ea typeface="Cantarell"/>
-              <a:cs typeface="Cantarell"/>
-              <a:sym typeface="Cantarell"/>
-            </a:endParaRPr>
-          </a:p>
-        </p:txBody>
-      </p:sp>
-      <p:sp>
-        <p:nvSpPr>
-          <p:cNvPr id="186" name="Shape 186"/>
-          <p:cNvSpPr txBox="1"/>
-          <p:nvPr/>
-        </p:nvSpPr>
-        <p:spPr>
-          <a:xfrm>
-            <a:off x="665075" y="391750"/>
-            <a:ext cx="4585499" cy="457200"/>
-          </a:xfrm>
-          <a:prstGeom prst="rect">
-            <a:avLst/>
-          </a:prstGeom>
-        </p:spPr>
-        <p:txBody>
-          <a:bodyPr lIns="91425" tIns="91425" rIns="91425" bIns="91425" anchor="t" anchorCtr="0">
-            <a:noAutofit/>
-          </a:bodyPr>
-          <a:lstStyle/>
-          <a:p>
-            <a:pPr lvl="0" rtl="0">
-              <a:buNone/>
-            </a:pPr>
-            <a:r>
-              <a:rPr lang="en" sz="2400">
-                <a:latin typeface="Cantarell"/>
-                <a:ea typeface="Cantarell"/>
-                <a:cs typeface="Cantarell"/>
-                <a:sym typeface="Cantarell"/>
-              </a:rPr>
-              <a:t>Product Features (Continued)</a:t>
-            </a:r>
-          </a:p>
-        </p:txBody>
-      </p:sp>
-    </p:spTree>
-  </p:cSld>
-  <p:clrMapOvr>
-    <a:masterClrMapping/>
-  </p:clrMapOvr>
-  <p:transition spd="slow">
-    <p:cut/>
-  </p:transition>
-  <p:timing>
-    <p:tnLst>
-      <p:par>
-        <p:cTn id="1" dur="indefinite" restart="never" nodeType="tmRoot"/>
-      </p:par>
-    </p:tnLst>
-  </p:timing>
-</p:sld>
-</file>
-
-<file path=ppt/slides/slide11.xml><?xml version="1.0" encoding="utf-8"?>
-<p:sld xmlns:a="http://schemas.openxmlformats.org/drawingml/2006/main" xmlns:r="http://schemas.openxmlformats.org/officeDocument/2006/relationships" xmlns:p="http://schemas.openxmlformats.org/presentationml/2006/main">
-  <p:cSld>
-    <p:spTree>
-      <p:nvGrpSpPr>
         <p:cNvPr id="1" name="Shape 190"/>
         <p:cNvGrpSpPr/>
         <p:nvPr/>
@@ -14979,7 +14486,7 @@
 </p:sld>
 </file>
 
-<file path=ppt/slides/slide12.xml><?xml version="1.0" encoding="utf-8"?>
+<file path=ppt/slides/slide11.xml><?xml version="1.0" encoding="utf-8"?>
 <p:sld xmlns:a="http://schemas.openxmlformats.org/drawingml/2006/main" xmlns:r="http://schemas.openxmlformats.org/officeDocument/2006/relationships" xmlns:p="http://schemas.openxmlformats.org/presentationml/2006/main">
   <p:cSld>
     <p:spTree>
@@ -17194,416 +16701,6 @@
 </file>
 
 <file path=ppt/slides/slide8.xml><?xml version="1.0" encoding="utf-8"?>
-<p:sld xmlns:a="http://schemas.openxmlformats.org/drawingml/2006/main" xmlns:r="http://schemas.openxmlformats.org/officeDocument/2006/relationships" xmlns:p="http://schemas.openxmlformats.org/presentationml/2006/main">
-  <p:cSld>
-    <p:spTree>
-      <p:nvGrpSpPr>
-        <p:cNvPr id="1" name="Shape 164"/>
-        <p:cNvGrpSpPr/>
-        <p:nvPr/>
-      </p:nvGrpSpPr>
-      <p:grpSpPr>
-        <a:xfrm>
-          <a:off x="0" y="0"/>
-          <a:ext cx="0" cy="0"/>
-          <a:chOff x="0" y="0"/>
-          <a:chExt cx="0" cy="0"/>
-        </a:xfrm>
-      </p:grpSpPr>
-      <p:sp>
-        <p:nvSpPr>
-          <p:cNvPr id="165" name="Shape 165"/>
-          <p:cNvSpPr/>
-          <p:nvPr/>
-        </p:nvSpPr>
-        <p:spPr>
-          <a:xfrm>
-            <a:off x="5486400" y="5486400"/>
-            <a:ext cx="3657599" cy="1367327"/>
-          </a:xfrm>
-          <a:prstGeom prst="rect">
-            <a:avLst/>
-          </a:prstGeom>
-          <a:blipFill>
-            <a:blip r:embed="rId3"/>
-            <a:stretch>
-              <a:fillRect/>
-            </a:stretch>
-          </a:blipFill>
-        </p:spPr>
-      </p:sp>
-      <p:cxnSp>
-        <p:nvCxnSpPr>
-          <p:cNvPr id="166" name="Shape 166"/>
-          <p:cNvCxnSpPr/>
-          <p:nvPr/>
-        </p:nvCxnSpPr>
-        <p:spPr>
-          <a:xfrm>
-            <a:off x="0" y="1066800"/>
-            <a:ext cx="6019799" cy="0"/>
-          </a:xfrm>
-          <a:prstGeom prst="straightConnector1">
-            <a:avLst/>
-          </a:prstGeom>
-          <a:noFill/>
-          <a:ln w="28575" cap="flat">
-            <a:solidFill>
-              <a:schemeClr val="dk1"/>
-            </a:solidFill>
-            <a:prstDash val="solid"/>
-            <a:round/>
-            <a:headEnd type="none" w="med" len="med"/>
-            <a:tailEnd type="none" w="med" len="med"/>
-          </a:ln>
-        </p:spPr>
-      </p:cxnSp>
-      <p:sp>
-        <p:nvSpPr>
-          <p:cNvPr id="167" name="Shape 167"/>
-          <p:cNvSpPr txBox="1"/>
-          <p:nvPr/>
-        </p:nvSpPr>
-        <p:spPr>
-          <a:xfrm>
-            <a:off x="665075" y="1350325"/>
-            <a:ext cx="6468300" cy="4031999"/>
-          </a:xfrm>
-          <a:prstGeom prst="rect">
-            <a:avLst/>
-          </a:prstGeom>
-          <a:noFill/>
-          <a:ln>
-            <a:noFill/>
-          </a:ln>
-        </p:spPr>
-        <p:txBody>
-          <a:bodyPr lIns="91425" tIns="45700" rIns="91425" bIns="45700" anchor="t" anchorCtr="0">
-            <a:noAutofit/>
-          </a:bodyPr>
-          <a:lstStyle/>
-          <a:p>
-            <a:pPr lvl="0" rtl="0">
-              <a:buNone/>
-            </a:pPr>
-            <a:r>
-              <a:rPr lang="en" sz="1800" dirty="0">
-                <a:latin typeface="Cantarell"/>
-                <a:ea typeface="Cantarell"/>
-                <a:cs typeface="Cantarell"/>
-                <a:sym typeface="Cantarell"/>
-              </a:rPr>
-              <a:t>User Features:</a:t>
-            </a:r>
-          </a:p>
-          <a:p>
-            <a:pPr marL="457200" lvl="0" indent="-342900" rtl="0">
-              <a:spcBef>
-                <a:spcPts val="600"/>
-              </a:spcBef>
-              <a:buClr>
-                <a:srgbClr val="000000"/>
-              </a:buClr>
-              <a:buSzPct val="100000"/>
-              <a:buFont typeface="Cantarell"/>
-              <a:buChar char="●"/>
-            </a:pPr>
-            <a:r>
-              <a:rPr lang="en" sz="1800" dirty="0">
-                <a:latin typeface="Cantarell"/>
-                <a:ea typeface="Cantarell"/>
-                <a:cs typeface="Cantarell"/>
-                <a:sym typeface="Cantarell"/>
-              </a:rPr>
-              <a:t>Rate parking capacity</a:t>
-            </a:r>
-          </a:p>
-          <a:p>
-            <a:pPr marL="914400" lvl="1" indent="-342900" rtl="0">
-              <a:spcBef>
-                <a:spcPts val="600"/>
-              </a:spcBef>
-              <a:buClr>
-                <a:srgbClr val="000000"/>
-              </a:buClr>
-              <a:buSzPct val="100000"/>
-              <a:buFont typeface="Cantarell"/>
-              <a:buChar char="○"/>
-            </a:pPr>
-            <a:r>
-              <a:rPr lang="en" sz="1800" dirty="0">
-                <a:latin typeface="Cantarell"/>
-                <a:ea typeface="Cantarell"/>
-                <a:cs typeface="Cantarell"/>
-                <a:sym typeface="Cantarell"/>
-              </a:rPr>
-              <a:t>Full = 1 pony</a:t>
-            </a:r>
-          </a:p>
-          <a:p>
-            <a:pPr marL="914400" lvl="1" indent="-342900" rtl="0">
-              <a:spcBef>
-                <a:spcPts val="600"/>
-              </a:spcBef>
-              <a:buClr>
-                <a:srgbClr val="000000"/>
-              </a:buClr>
-              <a:buSzPct val="100000"/>
-              <a:buFont typeface="Cantarell"/>
-              <a:buChar char="○"/>
-            </a:pPr>
-            <a:r>
-              <a:rPr lang="en" sz="1800" dirty="0">
-                <a:latin typeface="Cantarell"/>
-                <a:ea typeface="Cantarell"/>
-                <a:cs typeface="Cantarell"/>
-                <a:sym typeface="Cantarell"/>
-              </a:rPr>
-              <a:t>Scarce = 2 ponies</a:t>
-            </a:r>
-          </a:p>
-          <a:p>
-            <a:pPr marL="914400" lvl="1" indent="-342900" rtl="0">
-              <a:spcBef>
-                <a:spcPts val="600"/>
-              </a:spcBef>
-              <a:buClr>
-                <a:srgbClr val="000000"/>
-              </a:buClr>
-              <a:buSzPct val="100000"/>
-              <a:buFont typeface="Cantarell"/>
-              <a:buChar char="○"/>
-            </a:pPr>
-            <a:r>
-              <a:rPr lang="en" sz="1800" dirty="0">
-                <a:latin typeface="Cantarell"/>
-                <a:ea typeface="Cantarell"/>
-                <a:cs typeface="Cantarell"/>
-                <a:sym typeface="Cantarell"/>
-              </a:rPr>
-              <a:t>Some = 3 ponies</a:t>
-            </a:r>
-          </a:p>
-          <a:p>
-            <a:pPr marL="914400" lvl="1" indent="-342900" rtl="0">
-              <a:spcBef>
-                <a:spcPts val="600"/>
-              </a:spcBef>
-              <a:buClr>
-                <a:srgbClr val="000000"/>
-              </a:buClr>
-              <a:buSzPct val="100000"/>
-              <a:buFont typeface="Cantarell"/>
-              <a:buChar char="○"/>
-            </a:pPr>
-            <a:r>
-              <a:rPr lang="en" sz="1800" dirty="0">
-                <a:latin typeface="Cantarell"/>
-                <a:ea typeface="Cantarell"/>
-                <a:cs typeface="Cantarell"/>
-                <a:sym typeface="Cantarell"/>
-              </a:rPr>
-              <a:t>Plenty = 4 ponies</a:t>
-            </a:r>
-          </a:p>
-          <a:p>
-            <a:pPr marL="914400" lvl="1" indent="-342900" rtl="0">
-              <a:spcBef>
-                <a:spcPts val="600"/>
-              </a:spcBef>
-              <a:buClr>
-                <a:srgbClr val="000000"/>
-              </a:buClr>
-              <a:buSzPct val="100000"/>
-              <a:buFont typeface="Cantarell"/>
-              <a:buChar char="○"/>
-            </a:pPr>
-            <a:r>
-              <a:rPr lang="en" sz="1800" dirty="0">
-                <a:latin typeface="Cantarell"/>
-                <a:ea typeface="Cantarell"/>
-                <a:cs typeface="Cantarell"/>
-                <a:sym typeface="Cantarell"/>
-              </a:rPr>
-              <a:t>Empty = 5 </a:t>
-            </a:r>
-            <a:r>
-              <a:rPr lang="en" sz="1800" dirty="0" smtClean="0">
-                <a:latin typeface="Cantarell"/>
-                <a:ea typeface="Cantarell"/>
-                <a:cs typeface="Cantarell"/>
-                <a:sym typeface="Cantarell"/>
-              </a:rPr>
-              <a:t>ponies</a:t>
-            </a:r>
-          </a:p>
-          <a:p>
-            <a:pPr marL="571500" lvl="1" rtl="0">
-              <a:spcBef>
-                <a:spcPts val="600"/>
-              </a:spcBef>
-              <a:buClr>
-                <a:srgbClr val="000000"/>
-              </a:buClr>
-              <a:buSzPct val="100000"/>
-            </a:pPr>
-            <a:endParaRPr lang="en" sz="1800" dirty="0">
-              <a:latin typeface="Cantarell"/>
-              <a:ea typeface="Cantarell"/>
-              <a:cs typeface="Cantarell"/>
-              <a:sym typeface="Cantarell"/>
-            </a:endParaRPr>
-          </a:p>
-          <a:p>
-            <a:pPr marL="457200" lvl="0" indent="-342900" rtl="0">
-              <a:buClr>
-                <a:srgbClr val="000000"/>
-              </a:buClr>
-              <a:buSzPct val="100000"/>
-              <a:buFont typeface="Cantarell"/>
-              <a:buChar char="●"/>
-            </a:pPr>
-            <a:r>
-              <a:rPr lang="en" sz="1800" dirty="0">
-                <a:latin typeface="Cantarell"/>
-                <a:ea typeface="Cantarell"/>
-                <a:cs typeface="Cantarell"/>
-                <a:sym typeface="Cantarell"/>
-              </a:rPr>
-              <a:t>Add brief (140 characters or less) comments about a parking garage</a:t>
-            </a:r>
-          </a:p>
-          <a:p>
-            <a:endParaRPr lang="en" sz="1800" dirty="0">
-              <a:latin typeface="Cantarell"/>
-              <a:ea typeface="Cantarell"/>
-              <a:cs typeface="Cantarell"/>
-              <a:sym typeface="Cantarell"/>
-            </a:endParaRPr>
-          </a:p>
-          <a:p>
-            <a:pPr marL="457200" lvl="0" indent="-342900" rtl="0">
-              <a:buClr>
-                <a:srgbClr val="000000"/>
-              </a:buClr>
-              <a:buSzPct val="100000"/>
-              <a:buFont typeface="Cantarell"/>
-              <a:buChar char="●"/>
-            </a:pPr>
-            <a:r>
-              <a:rPr lang="en" sz="1800" dirty="0">
-                <a:solidFill>
-                  <a:schemeClr val="dk1"/>
-                </a:solidFill>
-                <a:latin typeface="Cantarell"/>
-                <a:ea typeface="Cantarell"/>
-                <a:cs typeface="Cantarell"/>
-                <a:sym typeface="Cantarell"/>
-              </a:rPr>
-              <a:t>View times when garage is least or most active</a:t>
-            </a:r>
-          </a:p>
-          <a:p>
-            <a:endParaRPr lang="en" sz="1800" dirty="0">
-              <a:solidFill>
-                <a:schemeClr val="dk1"/>
-              </a:solidFill>
-              <a:latin typeface="Cantarell"/>
-              <a:ea typeface="Cantarell"/>
-              <a:cs typeface="Cantarell"/>
-              <a:sym typeface="Cantarell"/>
-            </a:endParaRPr>
-          </a:p>
-          <a:p>
-            <a:endParaRPr lang="en" sz="1800" dirty="0">
-              <a:solidFill>
-                <a:schemeClr val="dk1"/>
-              </a:solidFill>
-              <a:latin typeface="Cantarell"/>
-              <a:ea typeface="Cantarell"/>
-              <a:cs typeface="Cantarell"/>
-              <a:sym typeface="Cantarell"/>
-            </a:endParaRPr>
-          </a:p>
-          <a:p>
-            <a:endParaRPr lang="en" sz="1800" dirty="0">
-              <a:solidFill>
-                <a:schemeClr val="dk1"/>
-              </a:solidFill>
-              <a:latin typeface="Cantarell"/>
-              <a:ea typeface="Cantarell"/>
-              <a:cs typeface="Cantarell"/>
-              <a:sym typeface="Cantarell"/>
-            </a:endParaRPr>
-          </a:p>
-          <a:p>
-            <a:endParaRPr lang="en" sz="1800" dirty="0">
-              <a:solidFill>
-                <a:schemeClr val="dk1"/>
-              </a:solidFill>
-              <a:latin typeface="Cantarell"/>
-              <a:ea typeface="Cantarell"/>
-              <a:cs typeface="Cantarell"/>
-              <a:sym typeface="Cantarell"/>
-            </a:endParaRPr>
-          </a:p>
-        </p:txBody>
-      </p:sp>
-      <p:sp>
-        <p:nvSpPr>
-          <p:cNvPr id="168" name="Shape 168"/>
-          <p:cNvSpPr txBox="1"/>
-          <p:nvPr/>
-        </p:nvSpPr>
-        <p:spPr>
-          <a:xfrm>
-            <a:off x="665075" y="391750"/>
-            <a:ext cx="4585499" cy="457200"/>
-          </a:xfrm>
-          <a:prstGeom prst="rect">
-            <a:avLst/>
-          </a:prstGeom>
-        </p:spPr>
-        <p:txBody>
-          <a:bodyPr lIns="91425" tIns="91425" rIns="91425" bIns="91425" anchor="t" anchorCtr="0">
-            <a:noAutofit/>
-          </a:bodyPr>
-          <a:lstStyle/>
-          <a:p>
-            <a:pPr lvl="0" rtl="0">
-              <a:buNone/>
-            </a:pPr>
-            <a:r>
-              <a:rPr lang="en" sz="2400">
-                <a:latin typeface="Cantarell"/>
-                <a:ea typeface="Cantarell"/>
-                <a:cs typeface="Cantarell"/>
-                <a:sym typeface="Cantarell"/>
-              </a:rPr>
-              <a:t>Product Features (Continued)</a:t>
-            </a:r>
-          </a:p>
-        </p:txBody>
-      </p:sp>
-    </p:spTree>
-  </p:cSld>
-  <p:clrMapOvr>
-    <a:masterClrMapping/>
-  </p:clrMapOvr>
-  <p:transition spd="slow">
-    <p:cut/>
-  </p:transition>
-  <p:timing>
-    <p:tnLst>
-      <p:par>
-        <p:cTn id="1" dur="indefinite" restart="never" nodeType="tmRoot"/>
-      </p:par>
-    </p:tnLst>
-  </p:timing>
-</p:sld>
-</file>
-
-<file path=ppt/slides/slide9.xml><?xml version="1.0" encoding="utf-8"?>
 <p:sld xmlns:a="http://schemas.openxmlformats.org/drawingml/2006/main" xmlns:r="http://schemas.openxmlformats.org/officeDocument/2006/relationships" xmlns:p="http://schemas.openxmlformats.org/presentationml/2006/main">
   <p:cSld>
     <p:spTree>
@@ -18172,6 +17269,398 @@
             <a:noFill/>
           </a:ln>
         </p:spPr>
+      </p:sp>
+    </p:spTree>
+  </p:cSld>
+  <p:clrMapOvr>
+    <a:masterClrMapping/>
+  </p:clrMapOvr>
+  <p:transition spd="slow">
+    <p:cut/>
+  </p:transition>
+  <p:timing>
+    <p:tnLst>
+      <p:par>
+        <p:cTn id="1" dur="indefinite" restart="never" nodeType="tmRoot"/>
+      </p:par>
+    </p:tnLst>
+  </p:timing>
+</p:sld>
+</file>
+
+<file path=ppt/slides/slide9.xml><?xml version="1.0" encoding="utf-8"?>
+<p:sld xmlns:a="http://schemas.openxmlformats.org/drawingml/2006/main" xmlns:r="http://schemas.openxmlformats.org/officeDocument/2006/relationships" xmlns:p="http://schemas.openxmlformats.org/presentationml/2006/main">
+  <p:cSld>
+    <p:spTree>
+      <p:nvGrpSpPr>
+        <p:cNvPr id="1" name="Shape 182"/>
+        <p:cNvGrpSpPr/>
+        <p:nvPr/>
+      </p:nvGrpSpPr>
+      <p:grpSpPr>
+        <a:xfrm>
+          <a:off x="0" y="0"/>
+          <a:ext cx="0" cy="0"/>
+          <a:chOff x="0" y="0"/>
+          <a:chExt cx="0" cy="0"/>
+        </a:xfrm>
+      </p:grpSpPr>
+      <p:sp>
+        <p:nvSpPr>
+          <p:cNvPr id="183" name="Shape 183"/>
+          <p:cNvSpPr/>
+          <p:nvPr/>
+        </p:nvSpPr>
+        <p:spPr>
+          <a:xfrm>
+            <a:off x="5486400" y="5486400"/>
+            <a:ext cx="3657599" cy="1367326"/>
+          </a:xfrm>
+          <a:prstGeom prst="rect">
+            <a:avLst/>
+          </a:prstGeom>
+          <a:blipFill>
+            <a:blip r:embed="rId3"/>
+            <a:stretch>
+              <a:fillRect/>
+            </a:stretch>
+          </a:blipFill>
+        </p:spPr>
+      </p:sp>
+      <p:cxnSp>
+        <p:nvCxnSpPr>
+          <p:cNvPr id="184" name="Shape 184"/>
+          <p:cNvCxnSpPr/>
+          <p:nvPr/>
+        </p:nvCxnSpPr>
+        <p:spPr>
+          <a:xfrm>
+            <a:off x="0" y="1066800"/>
+            <a:ext cx="6019799" cy="0"/>
+          </a:xfrm>
+          <a:prstGeom prst="straightConnector1">
+            <a:avLst/>
+          </a:prstGeom>
+          <a:noFill/>
+          <a:ln w="28575" cap="flat">
+            <a:solidFill>
+              <a:schemeClr val="dk1"/>
+            </a:solidFill>
+            <a:prstDash val="solid"/>
+            <a:round/>
+            <a:headEnd type="none" w="med" len="med"/>
+            <a:tailEnd type="none" w="med" len="med"/>
+          </a:ln>
+        </p:spPr>
+      </p:cxnSp>
+      <p:sp>
+        <p:nvSpPr>
+          <p:cNvPr id="185" name="Shape 185"/>
+          <p:cNvSpPr txBox="1"/>
+          <p:nvPr/>
+        </p:nvSpPr>
+        <p:spPr>
+          <a:xfrm>
+            <a:off x="665075" y="1350325"/>
+            <a:ext cx="6468300" cy="4031999"/>
+          </a:xfrm>
+          <a:prstGeom prst="rect">
+            <a:avLst/>
+          </a:prstGeom>
+          <a:noFill/>
+          <a:ln>
+            <a:noFill/>
+          </a:ln>
+        </p:spPr>
+        <p:txBody>
+          <a:bodyPr lIns="91425" tIns="45700" rIns="91425" bIns="45700" anchor="t" anchorCtr="0">
+            <a:noAutofit/>
+          </a:bodyPr>
+          <a:lstStyle/>
+          <a:p>
+            <a:pPr marR="0" lvl="0" algn="l" rtl="0">
+              <a:buNone/>
+            </a:pPr>
+            <a:r>
+              <a:rPr lang="en" sz="1800" dirty="0">
+                <a:solidFill>
+                  <a:schemeClr val="dk1"/>
+                </a:solidFill>
+                <a:latin typeface="Cantarell"/>
+                <a:ea typeface="Cantarell"/>
+                <a:cs typeface="Cantarell"/>
+                <a:sym typeface="Cantarell"/>
+              </a:rPr>
+              <a:t>User Features (Continued):</a:t>
+            </a:r>
+          </a:p>
+          <a:p>
+            <a:pPr marL="457200" marR="0" lvl="0" indent="-342900" algn="l" rtl="0">
+              <a:buClr>
+                <a:srgbClr val="000000"/>
+              </a:buClr>
+              <a:buSzPct val="100000"/>
+              <a:buFont typeface="Cantarell"/>
+              <a:buChar char="●"/>
+            </a:pPr>
+            <a:r>
+              <a:rPr lang="en" sz="1800" b="0" i="0" u="none" strike="noStrike" cap="none" baseline="0" dirty="0">
+                <a:solidFill>
+                  <a:schemeClr val="dk1"/>
+                </a:solidFill>
+                <a:latin typeface="Cantarell"/>
+                <a:ea typeface="Cantarell"/>
+                <a:cs typeface="Cantarell"/>
+                <a:sym typeface="Cantarell"/>
+              </a:rPr>
+              <a:t>Remember where I was? → Allow user to post memo or record location to remember location in one </a:t>
+            </a:r>
+            <a:r>
+              <a:rPr lang="en" sz="1800" b="0" i="0" u="none" strike="noStrike" cap="none" baseline="0" dirty="0" smtClean="0">
+                <a:solidFill>
+                  <a:schemeClr val="dk1"/>
+                </a:solidFill>
+                <a:latin typeface="Cantarell"/>
+                <a:ea typeface="Cantarell"/>
+                <a:cs typeface="Cantarell"/>
+                <a:sym typeface="Cantarell"/>
+              </a:rPr>
+              <a:t>click</a:t>
+            </a:r>
+          </a:p>
+          <a:p>
+            <a:pPr marL="114300" marR="0" lvl="0" algn="l" rtl="0">
+              <a:buClr>
+                <a:srgbClr val="000000"/>
+              </a:buClr>
+              <a:buSzPct val="100000"/>
+            </a:pPr>
+            <a:endParaRPr lang="en" sz="1800" b="0" i="0" u="none" strike="noStrike" cap="none" baseline="0" dirty="0">
+              <a:solidFill>
+                <a:schemeClr val="dk1"/>
+              </a:solidFill>
+              <a:latin typeface="Cantarell"/>
+              <a:ea typeface="Cantarell"/>
+              <a:cs typeface="Cantarell"/>
+              <a:sym typeface="Cantarell"/>
+            </a:endParaRPr>
+          </a:p>
+          <a:p>
+            <a:pPr marL="457200" marR="0" lvl="0" indent="-342900" algn="l" rtl="0">
+              <a:buClr>
+                <a:srgbClr val="000000"/>
+              </a:buClr>
+              <a:buSzPct val="100000"/>
+              <a:buFont typeface="Cantarell"/>
+              <a:buChar char="●"/>
+            </a:pPr>
+            <a:r>
+              <a:rPr lang="en" sz="1800" b="0" i="0" u="none" strike="noStrike" cap="none" baseline="0" dirty="0">
+                <a:solidFill>
+                  <a:schemeClr val="dk1"/>
+                </a:solidFill>
+                <a:latin typeface="Cantarell"/>
+                <a:ea typeface="Cantarell"/>
+                <a:cs typeface="Cantarell"/>
+                <a:sym typeface="Cantarell"/>
+              </a:rPr>
+              <a:t>One click Google Map directions to parking garage</a:t>
+            </a:r>
+          </a:p>
+          <a:p>
+            <a:endParaRPr lang="en" sz="1800" b="0" i="0" u="none" strike="noStrike" cap="none" baseline="0" dirty="0">
+              <a:solidFill>
+                <a:schemeClr val="dk1"/>
+              </a:solidFill>
+              <a:latin typeface="Cantarell"/>
+              <a:ea typeface="Cantarell"/>
+              <a:cs typeface="Cantarell"/>
+              <a:sym typeface="Cantarell"/>
+            </a:endParaRPr>
+          </a:p>
+          <a:p>
+            <a:pPr marL="457200" lvl="0" indent="-342900" rtl="0">
+              <a:buClr>
+                <a:srgbClr val="000000"/>
+              </a:buClr>
+              <a:buSzPct val="100000"/>
+              <a:buFont typeface="Cantarell"/>
+              <a:buChar char="●"/>
+            </a:pPr>
+            <a:r>
+              <a:rPr lang="en" sz="1800" dirty="0">
+                <a:latin typeface="Cantarell"/>
+                <a:ea typeface="Cantarell"/>
+                <a:cs typeface="Cantarell"/>
+                <a:sym typeface="Cantarell"/>
+              </a:rPr>
+              <a:t>QR code accessibility</a:t>
+            </a:r>
+          </a:p>
+          <a:p>
+            <a:endParaRPr lang="en" sz="1800" dirty="0">
+              <a:latin typeface="Cantarell"/>
+              <a:ea typeface="Cantarell"/>
+              <a:cs typeface="Cantarell"/>
+              <a:sym typeface="Cantarell"/>
+            </a:endParaRPr>
+          </a:p>
+          <a:p>
+            <a:pPr marL="457200" lvl="0" indent="-342900" rtl="0">
+              <a:buClr>
+                <a:srgbClr val="000000"/>
+              </a:buClr>
+              <a:buSzPct val="100000"/>
+              <a:buFont typeface="Cantarell"/>
+              <a:buChar char="●"/>
+            </a:pPr>
+            <a:r>
+              <a:rPr lang="en" sz="1800" dirty="0">
+                <a:latin typeface="Cantarell"/>
+                <a:ea typeface="Cantarell"/>
+                <a:cs typeface="Cantarell"/>
+                <a:sym typeface="Cantarell"/>
+              </a:rPr>
+              <a:t>Filter parking garages by cost, distance, and </a:t>
+            </a:r>
+            <a:r>
+              <a:rPr lang="en" sz="1800" dirty="0" smtClean="0">
+                <a:latin typeface="Cantarell"/>
+                <a:ea typeface="Cantarell"/>
+                <a:cs typeface="Cantarell"/>
+                <a:sym typeface="Cantarell"/>
+              </a:rPr>
+              <a:t>capacity</a:t>
+            </a:r>
+          </a:p>
+          <a:p>
+            <a:pPr marL="114300" lvl="0" rtl="0">
+              <a:buClr>
+                <a:srgbClr val="000000"/>
+              </a:buClr>
+              <a:buSzPct val="100000"/>
+            </a:pPr>
+            <a:endParaRPr lang="en" sz="1800" dirty="0">
+              <a:latin typeface="Cantarell"/>
+              <a:ea typeface="Cantarell"/>
+              <a:cs typeface="Cantarell"/>
+              <a:sym typeface="Cantarell"/>
+            </a:endParaRPr>
+          </a:p>
+          <a:p>
+            <a:pPr marL="457200" lvl="0" indent="-342900" rtl="0">
+              <a:buClr>
+                <a:schemeClr val="dk1"/>
+              </a:buClr>
+              <a:buSzPct val="100000"/>
+              <a:buFont typeface="Cantarell"/>
+              <a:buChar char="●"/>
+            </a:pPr>
+            <a:r>
+              <a:rPr lang="en" sz="1800" dirty="0">
+                <a:solidFill>
+                  <a:schemeClr val="dk1"/>
+                </a:solidFill>
+                <a:latin typeface="Cantarell"/>
+                <a:ea typeface="Cantarell"/>
+                <a:cs typeface="Cantarell"/>
+                <a:sym typeface="Cantarell"/>
+              </a:rPr>
+              <a:t>Ability to report a user if necessary</a:t>
+            </a:r>
+          </a:p>
+          <a:p>
+            <a:pPr marL="914400" lvl="1" indent="-342900" rtl="0">
+              <a:buClr>
+                <a:schemeClr val="dk1"/>
+              </a:buClr>
+              <a:buSzPct val="100000"/>
+              <a:buFont typeface="Cantarell"/>
+              <a:buChar char="○"/>
+            </a:pPr>
+            <a:r>
+              <a:rPr lang="en" sz="1800" dirty="0">
+                <a:solidFill>
+                  <a:schemeClr val="dk1"/>
+                </a:solidFill>
+                <a:latin typeface="Cantarell"/>
+                <a:ea typeface="Cantarell"/>
+                <a:cs typeface="Cantarell"/>
+                <a:sym typeface="Cantarell"/>
+              </a:rPr>
+              <a:t>For foul language or faulty ratings</a:t>
+            </a:r>
+          </a:p>
+          <a:p>
+            <a:endParaRPr lang="en" sz="1800" dirty="0">
+              <a:solidFill>
+                <a:schemeClr val="dk1"/>
+              </a:solidFill>
+              <a:latin typeface="Cantarell"/>
+              <a:ea typeface="Cantarell"/>
+              <a:cs typeface="Cantarell"/>
+              <a:sym typeface="Cantarell"/>
+            </a:endParaRPr>
+          </a:p>
+          <a:p>
+            <a:endParaRPr lang="en" sz="1800" dirty="0">
+              <a:solidFill>
+                <a:schemeClr val="dk1"/>
+              </a:solidFill>
+              <a:latin typeface="Cantarell"/>
+              <a:ea typeface="Cantarell"/>
+              <a:cs typeface="Cantarell"/>
+              <a:sym typeface="Cantarell"/>
+            </a:endParaRPr>
+          </a:p>
+          <a:p>
+            <a:endParaRPr lang="en" sz="1800" dirty="0">
+              <a:solidFill>
+                <a:schemeClr val="dk1"/>
+              </a:solidFill>
+              <a:latin typeface="Cantarell"/>
+              <a:ea typeface="Cantarell"/>
+              <a:cs typeface="Cantarell"/>
+              <a:sym typeface="Cantarell"/>
+            </a:endParaRPr>
+          </a:p>
+        </p:txBody>
+      </p:sp>
+      <p:sp>
+        <p:nvSpPr>
+          <p:cNvPr id="186" name="Shape 186"/>
+          <p:cNvSpPr txBox="1"/>
+          <p:nvPr/>
+        </p:nvSpPr>
+        <p:spPr>
+          <a:xfrm>
+            <a:off x="665075" y="391750"/>
+            <a:ext cx="4585499" cy="457200"/>
+          </a:xfrm>
+          <a:prstGeom prst="rect">
+            <a:avLst/>
+          </a:prstGeom>
+        </p:spPr>
+        <p:txBody>
+          <a:bodyPr lIns="91425" tIns="91425" rIns="91425" bIns="91425" anchor="t" anchorCtr="0">
+            <a:noAutofit/>
+          </a:bodyPr>
+          <a:lstStyle/>
+          <a:p>
+            <a:pPr lvl="0" rtl="0">
+              <a:buNone/>
+            </a:pPr>
+            <a:r>
+              <a:rPr lang="en" sz="2400">
+                <a:latin typeface="Cantarell"/>
+                <a:ea typeface="Cantarell"/>
+                <a:cs typeface="Cantarell"/>
+                <a:sym typeface="Cantarell"/>
+              </a:rPr>
+              <a:t>Product Features (Continued)</a:t>
+            </a:r>
+          </a:p>
+        </p:txBody>
       </p:sp>
     </p:spTree>
   </p:cSld>

</xml_diff>